<commit_message>
Update Blazor client instructions part
</commit_message>
<xml_diff>
--- a/docs/blazor-introduction.pptx
+++ b/docs/blazor-introduction.pptx
@@ -620,7 +620,7 @@
           <p:cNvPr id="2" name="Header Placeholder 1">
             <a:extLst>
               <a:ext uri="{FF2B5EF4-FFF2-40B4-BE49-F238E27FC236}">
-                <a16:creationId xmlns="" xmlns:a16="http://schemas.microsoft.com/office/drawing/2014/main" id="{FB109183-6A97-499C-A537-A98260FD926B}"/>
+                <a16:creationId xmlns:a16="http://schemas.microsoft.com/office/drawing/2014/main" xmlns="" id="{FB109183-6A97-499C-A537-A98260FD926B}"/>
               </a:ext>
             </a:extLst>
           </p:cNvPr>
@@ -657,7 +657,7 @@
           <p:cNvPr id="3" name="Date Placeholder 2">
             <a:extLst>
               <a:ext uri="{FF2B5EF4-FFF2-40B4-BE49-F238E27FC236}">
-                <a16:creationId xmlns="" xmlns:a16="http://schemas.microsoft.com/office/drawing/2014/main" id="{8B7B27EE-C43D-48BC-BE7F-8AA923ADF511}"/>
+                <a16:creationId xmlns:a16="http://schemas.microsoft.com/office/drawing/2014/main" xmlns="" id="{8B7B27EE-C43D-48BC-BE7F-8AA923ADF511}"/>
               </a:ext>
             </a:extLst>
           </p:cNvPr>
@@ -687,7 +687,7 @@
           <a:p>
             <a:fld id="{6A4A805B-461C-4670-9402-81E801250286}" type="datetimeFigureOut">
               <a:rPr lang="en-US" smtClean="0"/>
-              <a:t>7/6/2019</a:t>
+              <a:t>9/29/2019</a:t>
             </a:fld>
             <a:endParaRPr lang="en-US"/>
           </a:p>
@@ -698,7 +698,7 @@
           <p:cNvPr id="4" name="Footer Placeholder 3">
             <a:extLst>
               <a:ext uri="{FF2B5EF4-FFF2-40B4-BE49-F238E27FC236}">
-                <a16:creationId xmlns="" xmlns:a16="http://schemas.microsoft.com/office/drawing/2014/main" id="{ECE6E46E-E7C4-451B-8240-39427C18E875}"/>
+                <a16:creationId xmlns:a16="http://schemas.microsoft.com/office/drawing/2014/main" xmlns="" id="{ECE6E46E-E7C4-451B-8240-39427C18E875}"/>
               </a:ext>
             </a:extLst>
           </p:cNvPr>
@@ -735,7 +735,7 @@
           <p:cNvPr id="5" name="Slide Number Placeholder 4">
             <a:extLst>
               <a:ext uri="{FF2B5EF4-FFF2-40B4-BE49-F238E27FC236}">
-                <a16:creationId xmlns="" xmlns:a16="http://schemas.microsoft.com/office/drawing/2014/main" id="{83B97971-52EE-4BDD-A93C-B1B507E4CC55}"/>
+                <a16:creationId xmlns:a16="http://schemas.microsoft.com/office/drawing/2014/main" xmlns="" id="{83B97971-52EE-4BDD-A93C-B1B507E4CC55}"/>
               </a:ext>
             </a:extLst>
           </p:cNvPr>
@@ -936,7 +936,7 @@
           <p:cNvPr id="11" name="Header Placeholder 10">
             <a:extLst>
               <a:ext uri="{FF2B5EF4-FFF2-40B4-BE49-F238E27FC236}">
-                <a16:creationId xmlns="" xmlns:a16="http://schemas.microsoft.com/office/drawing/2014/main" id="{C6085E80-0CA6-429A-827F-050AA72B63D6}"/>
+                <a16:creationId xmlns:a16="http://schemas.microsoft.com/office/drawing/2014/main" xmlns="" id="{C6085E80-0CA6-429A-827F-050AA72B63D6}"/>
               </a:ext>
             </a:extLst>
           </p:cNvPr>
@@ -1156,7 +1156,7 @@
           <p:cNvPr id="5" name="Header Placeholder 10">
             <a:extLst>
               <a:ext uri="{FF2B5EF4-FFF2-40B4-BE49-F238E27FC236}">
-                <a16:creationId xmlns="" xmlns:a16="http://schemas.microsoft.com/office/drawing/2014/main" id="{FF939A78-2FF4-470E-8E9D-B65CE1E86397}"/>
+                <a16:creationId xmlns:a16="http://schemas.microsoft.com/office/drawing/2014/main" xmlns="" id="{FF939A78-2FF4-470E-8E9D-B65CE1E86397}"/>
               </a:ext>
             </a:extLst>
           </p:cNvPr>
@@ -1267,7 +1267,7 @@
           <p:cNvPr id="5" name="TextBox 4">
             <a:extLst>
               <a:ext uri="{FF2B5EF4-FFF2-40B4-BE49-F238E27FC236}">
-                <a16:creationId xmlns="" xmlns:a16="http://schemas.microsoft.com/office/drawing/2014/main" id="{72D58D4C-8C36-4E83-A6D0-5CCDE628C6A1}"/>
+                <a16:creationId xmlns:a16="http://schemas.microsoft.com/office/drawing/2014/main" xmlns="" id="{72D58D4C-8C36-4E83-A6D0-5CCDE628C6A1}"/>
               </a:ext>
             </a:extLst>
           </p:cNvPr>
@@ -1332,7 +1332,7 @@
           <p:cNvPr id="6" name="TextBox 5">
             <a:extLst>
               <a:ext uri="{FF2B5EF4-FFF2-40B4-BE49-F238E27FC236}">
-                <a16:creationId xmlns="" xmlns:a16="http://schemas.microsoft.com/office/drawing/2014/main" id="{59D84138-C5D8-434E-B158-149140D533BE}"/>
+                <a16:creationId xmlns:a16="http://schemas.microsoft.com/office/drawing/2014/main" xmlns="" id="{59D84138-C5D8-434E-B158-149140D533BE}"/>
               </a:ext>
             </a:extLst>
           </p:cNvPr>
@@ -2026,7 +2026,7 @@
           <p:cNvPr id="2" name="Title 1">
             <a:extLst>
               <a:ext uri="{FF2B5EF4-FFF2-40B4-BE49-F238E27FC236}">
-                <a16:creationId xmlns="" xmlns:a16="http://schemas.microsoft.com/office/drawing/2014/main" id="{6F594C3A-647A-4380-8F58-7DACBC37B8D6}"/>
+                <a16:creationId xmlns:a16="http://schemas.microsoft.com/office/drawing/2014/main" xmlns="" id="{6F594C3A-647A-4380-8F58-7DACBC37B8D6}"/>
               </a:ext>
             </a:extLst>
           </p:cNvPr>
@@ -2054,7 +2054,7 @@
           <p:cNvPr id="3" name="TextBox 2">
             <a:extLst>
               <a:ext uri="{FF2B5EF4-FFF2-40B4-BE49-F238E27FC236}">
-                <a16:creationId xmlns="" xmlns:a16="http://schemas.microsoft.com/office/drawing/2014/main" id="{E231ED1D-3304-42EE-8EF4-679A6BE4CBA5}"/>
+                <a16:creationId xmlns:a16="http://schemas.microsoft.com/office/drawing/2014/main" xmlns="" id="{E231ED1D-3304-42EE-8EF4-679A6BE4CBA5}"/>
               </a:ext>
             </a:extLst>
           </p:cNvPr>
@@ -2500,7 +2500,7 @@
           <p:cNvPr id="3" name="Group 2">
             <a:extLst>
               <a:ext uri="{FF2B5EF4-FFF2-40B4-BE49-F238E27FC236}">
-                <a16:creationId xmlns="" xmlns:a16="http://schemas.microsoft.com/office/drawing/2014/main" id="{3AAD6D8B-19E8-4D03-AF4A-2ECBD7219199}"/>
+                <a16:creationId xmlns:a16="http://schemas.microsoft.com/office/drawing/2014/main" xmlns="" id="{3AAD6D8B-19E8-4D03-AF4A-2ECBD7219199}"/>
               </a:ext>
             </a:extLst>
           </p:cNvPr>
@@ -2520,7 +2520,7 @@
             <p:cNvPr id="5" name="Picture 4">
               <a:extLst>
                 <a:ext uri="{FF2B5EF4-FFF2-40B4-BE49-F238E27FC236}">
-                  <a16:creationId xmlns="" xmlns:a16="http://schemas.microsoft.com/office/drawing/2014/main" id="{ACCB7245-0950-4F4D-A2A6-296384195082}"/>
+                  <a16:creationId xmlns:a16="http://schemas.microsoft.com/office/drawing/2014/main" xmlns="" id="{ACCB7245-0950-4F4D-A2A6-296384195082}"/>
                 </a:ext>
               </a:extLst>
             </p:cNvPr>
@@ -2556,7 +2556,7 @@
             <p:cNvPr id="2" name="TextBox 1">
               <a:extLst>
                 <a:ext uri="{FF2B5EF4-FFF2-40B4-BE49-F238E27FC236}">
-                  <a16:creationId xmlns="" xmlns:a16="http://schemas.microsoft.com/office/drawing/2014/main" id="{ABA4263D-8DDB-49FB-AF7F-346C7DC7B3F9}"/>
+                  <a16:creationId xmlns:a16="http://schemas.microsoft.com/office/drawing/2014/main" xmlns="" id="{ABA4263D-8DDB-49FB-AF7F-346C7DC7B3F9}"/>
                 </a:ext>
               </a:extLst>
             </p:cNvPr>
@@ -3112,7 +3112,7 @@
           <p:cNvPr id="5" name="Group 4">
             <a:extLst>
               <a:ext uri="{FF2B5EF4-FFF2-40B4-BE49-F238E27FC236}">
-                <a16:creationId xmlns="" xmlns:a16="http://schemas.microsoft.com/office/drawing/2014/main" id="{90EF4A5C-345F-488C-AC5E-0AF3B8376036}"/>
+                <a16:creationId xmlns:a16="http://schemas.microsoft.com/office/drawing/2014/main" xmlns="" id="{90EF4A5C-345F-488C-AC5E-0AF3B8376036}"/>
               </a:ext>
             </a:extLst>
           </p:cNvPr>
@@ -3132,7 +3132,7 @@
             <p:cNvPr id="7" name="Picture 6">
               <a:extLst>
                 <a:ext uri="{FF2B5EF4-FFF2-40B4-BE49-F238E27FC236}">
-                  <a16:creationId xmlns="" xmlns:a16="http://schemas.microsoft.com/office/drawing/2014/main" id="{CC8E3C5F-48E2-412C-A5AF-F85384D5EE53}"/>
+                  <a16:creationId xmlns:a16="http://schemas.microsoft.com/office/drawing/2014/main" xmlns="" id="{CC8E3C5F-48E2-412C-A5AF-F85384D5EE53}"/>
                 </a:ext>
               </a:extLst>
             </p:cNvPr>
@@ -3168,7 +3168,7 @@
             <p:cNvPr id="8" name="TextBox 7">
               <a:extLst>
                 <a:ext uri="{FF2B5EF4-FFF2-40B4-BE49-F238E27FC236}">
-                  <a16:creationId xmlns="" xmlns:a16="http://schemas.microsoft.com/office/drawing/2014/main" id="{0A9EAD12-9B65-48D0-91A3-85F3DD932746}"/>
+                  <a16:creationId xmlns:a16="http://schemas.microsoft.com/office/drawing/2014/main" xmlns="" id="{0A9EAD12-9B65-48D0-91A3-85F3DD932746}"/>
                 </a:ext>
               </a:extLst>
             </p:cNvPr>
@@ -3390,7 +3390,7 @@
           <p:cNvPr id="7" name="Group 6">
             <a:extLst>
               <a:ext uri="{FF2B5EF4-FFF2-40B4-BE49-F238E27FC236}">
-                <a16:creationId xmlns="" xmlns:a16="http://schemas.microsoft.com/office/drawing/2014/main" id="{97550BA1-B17C-488A-B13B-EAE642576B33}"/>
+                <a16:creationId xmlns:a16="http://schemas.microsoft.com/office/drawing/2014/main" xmlns="" id="{97550BA1-B17C-488A-B13B-EAE642576B33}"/>
               </a:ext>
             </a:extLst>
           </p:cNvPr>
@@ -3410,7 +3410,7 @@
             <p:cNvPr id="8" name="Picture 7">
               <a:extLst>
                 <a:ext uri="{FF2B5EF4-FFF2-40B4-BE49-F238E27FC236}">
-                  <a16:creationId xmlns="" xmlns:a16="http://schemas.microsoft.com/office/drawing/2014/main" id="{26C5F131-CDD3-4833-8C45-E235D5E9F73B}"/>
+                  <a16:creationId xmlns:a16="http://schemas.microsoft.com/office/drawing/2014/main" xmlns="" id="{26C5F131-CDD3-4833-8C45-E235D5E9F73B}"/>
                 </a:ext>
               </a:extLst>
             </p:cNvPr>
@@ -3446,7 +3446,7 @@
             <p:cNvPr id="9" name="TextBox 8">
               <a:extLst>
                 <a:ext uri="{FF2B5EF4-FFF2-40B4-BE49-F238E27FC236}">
-                  <a16:creationId xmlns="" xmlns:a16="http://schemas.microsoft.com/office/drawing/2014/main" id="{9DBC19F9-263B-4FF9-BEAE-41F5BF5689F3}"/>
+                  <a16:creationId xmlns:a16="http://schemas.microsoft.com/office/drawing/2014/main" xmlns="" id="{9DBC19F9-263B-4FF9-BEAE-41F5BF5689F3}"/>
                 </a:ext>
               </a:extLst>
             </p:cNvPr>
@@ -3584,7 +3584,7 @@
           <p:cNvPr id="17" name="Picture 16">
             <a:extLst>
               <a:ext uri="{FF2B5EF4-FFF2-40B4-BE49-F238E27FC236}">
-                <a16:creationId xmlns="" xmlns:a16="http://schemas.microsoft.com/office/drawing/2014/main" id="{14FDA669-E474-4468-AC09-ED6F4A19D7A0}"/>
+                <a16:creationId xmlns:a16="http://schemas.microsoft.com/office/drawing/2014/main" xmlns="" id="{14FDA669-E474-4468-AC09-ED6F4A19D7A0}"/>
               </a:ext>
             </a:extLst>
           </p:cNvPr>
@@ -3620,7 +3620,7 @@
           <p:cNvPr id="18" name="TextBox 17">
             <a:extLst>
               <a:ext uri="{FF2B5EF4-FFF2-40B4-BE49-F238E27FC236}">
-                <a16:creationId xmlns="" xmlns:a16="http://schemas.microsoft.com/office/drawing/2014/main" id="{64B34822-29D0-402A-B058-E76EB9B985CC}"/>
+                <a16:creationId xmlns:a16="http://schemas.microsoft.com/office/drawing/2014/main" xmlns="" id="{64B34822-29D0-402A-B058-E76EB9B985CC}"/>
               </a:ext>
             </a:extLst>
           </p:cNvPr>
@@ -5980,7 +5980,7 @@
           <p:cNvPr id="2" name="Title 1">
             <a:extLst>
               <a:ext uri="{FF2B5EF4-FFF2-40B4-BE49-F238E27FC236}">
-                <a16:creationId xmlns="" xmlns:a16="http://schemas.microsoft.com/office/drawing/2014/main" id="{524C7287-25EE-41A6-A2BD-D98C5ADAF8E3}"/>
+                <a16:creationId xmlns:a16="http://schemas.microsoft.com/office/drawing/2014/main" xmlns="" id="{524C7287-25EE-41A6-A2BD-D98C5ADAF8E3}"/>
               </a:ext>
             </a:extLst>
           </p:cNvPr>
@@ -6017,7 +6017,7 @@
           <p:cNvPr id="3" name="Text Placeholder 2">
             <a:extLst>
               <a:ext uri="{FF2B5EF4-FFF2-40B4-BE49-F238E27FC236}">
-                <a16:creationId xmlns="" xmlns:a16="http://schemas.microsoft.com/office/drawing/2014/main" id="{23457379-948D-4845-B8BA-5CF9B789DD1A}"/>
+                <a16:creationId xmlns:a16="http://schemas.microsoft.com/office/drawing/2014/main" xmlns="" id="{23457379-948D-4845-B8BA-5CF9B789DD1A}"/>
               </a:ext>
             </a:extLst>
           </p:cNvPr>
@@ -6219,12 +6219,12 @@
           <a:lstStyle/>
           <a:p>
             <a:r>
-              <a:rPr lang="en-US" dirty="0" smtClean="0"/>
-              <a:t>Client-side </a:t>
-            </a:r>
-            <a:r>
               <a:rPr lang="en-US" dirty="0" err="1" smtClean="0"/>
               <a:t>Blazor</a:t>
+            </a:r>
+            <a:r>
+              <a:rPr lang="sr-Latn-BA" dirty="0" smtClean="0"/>
+              <a:t> WebAssembly (client-side)</a:t>
             </a:r>
             <a:endParaRPr lang="en-US" dirty="0"/>
           </a:p>
@@ -6375,12 +6375,12 @@
           <a:lstStyle/>
           <a:p>
             <a:r>
-              <a:rPr lang="en-US" dirty="0" smtClean="0"/>
-              <a:t>Server-side </a:t>
-            </a:r>
-            <a:r>
               <a:rPr lang="en-US" dirty="0" err="1" smtClean="0"/>
               <a:t>Blazor</a:t>
+            </a:r>
+            <a:r>
+              <a:rPr lang="sr-Latn-BA" dirty="0" smtClean="0"/>
+              <a:t> Server</a:t>
             </a:r>
             <a:endParaRPr lang="en-US" dirty="0"/>
           </a:p>
@@ -6454,12 +6454,12 @@
           <a:lstStyle/>
           <a:p>
             <a:r>
-              <a:rPr lang="en-US" dirty="0" smtClean="0"/>
-              <a:t>Server-side </a:t>
-            </a:r>
-            <a:r>
               <a:rPr lang="en-US" dirty="0" err="1" smtClean="0"/>
               <a:t>Blazor</a:t>
+            </a:r>
+            <a:r>
+              <a:rPr lang="sr-Latn-BA" dirty="0" smtClean="0"/>
+              <a:t> Server</a:t>
             </a:r>
             <a:endParaRPr lang="en-US" dirty="0"/>
           </a:p>
@@ -6741,7 +6741,7 @@
         <p:spPr>
           <a:xfrm>
             <a:off x="269239" y="1189177"/>
-            <a:ext cx="11653523" cy="2187907"/>
+            <a:ext cx="11653523" cy="2453364"/>
           </a:xfrm>
         </p:spPr>
         <p:txBody>
@@ -6749,44 +6749,69 @@
           <a:lstStyle/>
           <a:p>
             <a:r>
-              <a:rPr lang="en-US" dirty="0" smtClean="0"/>
-              <a:t>Server-side </a:t>
-            </a:r>
-            <a:r>
               <a:rPr lang="en-US" dirty="0" err="1" smtClean="0"/>
               <a:t>Blazor</a:t>
             </a:r>
             <a:r>
               <a:rPr lang="en-US" dirty="0" smtClean="0"/>
-              <a:t> is part of ASP.NET Core 3.0</a:t>
-            </a:r>
-          </a:p>
-          <a:p>
-            <a:pPr lvl="1"/>
+              <a:t> </a:t>
+            </a:r>
+            <a:r>
+              <a:rPr lang="sr-Latn-BA" dirty="0" smtClean="0"/>
+              <a:t>Server - released as </a:t>
+            </a:r>
             <a:r>
               <a:rPr lang="en-US" dirty="0" smtClean="0"/>
-              <a:t>September 2019.</a:t>
-            </a:r>
-          </a:p>
-          <a:p>
+              <a:t>part </a:t>
+            </a:r>
             <a:r>
               <a:rPr lang="en-US" dirty="0" smtClean="0"/>
-              <a:t>Client-side </a:t>
-            </a:r>
+              <a:t>of ASP.NET Core </a:t>
+            </a:r>
+            <a:r>
+              <a:rPr lang="en-US" dirty="0" smtClean="0"/>
+              <a:t>3.0</a:t>
+            </a:r>
+            <a:endParaRPr lang="sr-Latn-BA" dirty="0" smtClean="0"/>
+          </a:p>
+          <a:p>
             <a:r>
               <a:rPr lang="en-US" dirty="0" err="1" smtClean="0"/>
               <a:t>Blazor</a:t>
             </a:r>
             <a:r>
               <a:rPr lang="en-US" dirty="0" smtClean="0"/>
-              <a:t> will be out-of-band release</a:t>
+              <a:t> </a:t>
+            </a:r>
+            <a:r>
+              <a:rPr lang="sr-Latn-BA" dirty="0" smtClean="0"/>
+              <a:t>WebAssembly - </a:t>
+            </a:r>
+            <a:r>
+              <a:rPr lang="en-US" dirty="0" smtClean="0"/>
+              <a:t>out-of-band </a:t>
+            </a:r>
+            <a:r>
+              <a:rPr lang="en-US" dirty="0" smtClean="0"/>
+              <a:t>release</a:t>
             </a:r>
           </a:p>
           <a:p>
             <a:pPr lvl="1"/>
             <a:r>
               <a:rPr lang="en-US" dirty="0" smtClean="0"/>
-              <a:t>First quarter of 2020.?</a:t>
+              <a:t>First quarter of 2020</a:t>
+            </a:r>
+            <a:r>
+              <a:rPr lang="en-US" dirty="0" smtClean="0"/>
+              <a:t>.?</a:t>
+            </a:r>
+            <a:endParaRPr lang="sr-Latn-BA" dirty="0" smtClean="0"/>
+          </a:p>
+          <a:p>
+            <a:r>
+              <a:rPr lang="sr-Latn-BA" dirty="0" smtClean="0"/>
+              <a:t>Blazor xxx (native)?</a:t>
             </a:r>
             <a:endParaRPr lang="en-US" dirty="0"/>
           </a:p>
@@ -6837,7 +6862,7 @@
         </p:blipFill>
         <p:spPr>
           <a:xfrm>
-            <a:off x="3366052" y="3377084"/>
+            <a:off x="3366052" y="3642541"/>
             <a:ext cx="5459895" cy="3016763"/>
           </a:xfrm>
           <a:prstGeom prst="rect">
@@ -7856,13 +7881,13 @@
               <a:t>onclick</a:t>
             </a:r>
             <a:r>
-              <a:rPr lang="en-US" sz="1600" dirty="0">
+              <a:rPr lang="en-US" sz="1600" dirty="0" smtClean="0">
                 <a:latin typeface="Consolas" panose="020B0609020204030204" pitchFamily="49" charset="0"/>
               </a:rPr>
-              <a:t>="@</a:t>
-            </a:r>
-            <a:r>
-              <a:rPr lang="en-US" sz="1600" dirty="0" err="1">
+              <a:t>="</a:t>
+            </a:r>
+            <a:r>
+              <a:rPr lang="en-US" sz="1600" dirty="0" err="1" smtClean="0">
                 <a:latin typeface="Consolas" panose="020B0609020204030204" pitchFamily="49" charset="0"/>
               </a:rPr>
               <a:t>OnYes</a:t>
@@ -7923,7 +7948,25 @@
               <a:rPr lang="en-US" sz="1600" dirty="0">
                 <a:latin typeface="Consolas" panose="020B0609020204030204" pitchFamily="49" charset="0"/>
               </a:rPr>
-              <a:t>    private string Title { get; set; }</a:t>
+              <a:t>    </a:t>
+            </a:r>
+            <a:r>
+              <a:rPr lang="sr-Latn-BA" sz="1600" dirty="0" smtClean="0">
+                <a:latin typeface="Consolas" panose="020B0609020204030204" pitchFamily="49" charset="0"/>
+              </a:rPr>
+              <a:t>public </a:t>
+            </a:r>
+            <a:r>
+              <a:rPr lang="en-US" sz="1600" dirty="0" smtClean="0">
+                <a:latin typeface="Consolas" panose="020B0609020204030204" pitchFamily="49" charset="0"/>
+              </a:rPr>
+              <a:t>string </a:t>
+            </a:r>
+            <a:r>
+              <a:rPr lang="en-US" sz="1600" dirty="0">
+                <a:latin typeface="Consolas" panose="020B0609020204030204" pitchFamily="49" charset="0"/>
+              </a:rPr>
+              <a:t>Title { get; set; }</a:t>
             </a:r>
           </a:p>
           <a:p>
@@ -7953,16 +7996,22 @@
               <a:rPr lang="en-US" sz="1600" dirty="0">
                 <a:latin typeface="Consolas" panose="020B0609020204030204" pitchFamily="49" charset="0"/>
               </a:rPr>
-              <a:t>    private </a:t>
-            </a:r>
-            <a:r>
-              <a:rPr lang="en-US" sz="1600" dirty="0" err="1">
+              <a:t>    </a:t>
+            </a:r>
+            <a:r>
+              <a:rPr lang="sr-Latn-BA" sz="1600" dirty="0" smtClean="0">
+                <a:latin typeface="Consolas" panose="020B0609020204030204" pitchFamily="49" charset="0"/>
+              </a:rPr>
+              <a:t>public </a:t>
+            </a:r>
+            <a:r>
+              <a:rPr lang="en-US" sz="1600" dirty="0" err="1" smtClean="0">
                 <a:latin typeface="Consolas" panose="020B0609020204030204" pitchFamily="49" charset="0"/>
               </a:rPr>
               <a:t>RenderFragment</a:t>
             </a:r>
             <a:r>
-              <a:rPr lang="en-US" sz="1600" dirty="0">
+              <a:rPr lang="en-US" sz="1600" dirty="0" smtClean="0">
                 <a:latin typeface="Consolas" panose="020B0609020204030204" pitchFamily="49" charset="0"/>
               </a:rPr>
               <a:t> </a:t>
@@ -8430,16 +8479,24 @@
           <a:p>
             <a:pPr lvl="1"/>
             <a:r>
-              <a:rPr lang="en-US" dirty="0" smtClean="0"/>
-              <a:t>Client-side </a:t>
-            </a:r>
-            <a:r>
               <a:rPr lang="en-US" dirty="0" err="1" smtClean="0"/>
               <a:t>Blazor</a:t>
             </a:r>
             <a:r>
               <a:rPr lang="en-US" dirty="0" smtClean="0"/>
-              <a:t> bootstraps runtime and loads the assemblies for the app</a:t>
+              <a:t> </a:t>
+            </a:r>
+            <a:r>
+              <a:rPr lang="sr-Latn-BA" dirty="0" smtClean="0"/>
+              <a:t>WebAssembly </a:t>
+            </a:r>
+            <a:r>
+              <a:rPr lang="en-US" dirty="0" smtClean="0"/>
+              <a:t>bootstraps </a:t>
+            </a:r>
+            <a:r>
+              <a:rPr lang="en-US" dirty="0" smtClean="0"/>
+              <a:t>runtime and loads the assemblies for the app</a:t>
             </a:r>
           </a:p>
           <a:p>
@@ -8470,12 +8527,12 @@
           <a:lstStyle/>
           <a:p>
             <a:r>
-              <a:rPr lang="en-US" dirty="0" smtClean="0"/>
-              <a:t>Client-side </a:t>
-            </a:r>
-            <a:r>
               <a:rPr lang="en-US" dirty="0" err="1" smtClean="0"/>
               <a:t>Blazor</a:t>
+            </a:r>
+            <a:r>
+              <a:rPr lang="sr-Latn-BA" dirty="0" smtClean="0"/>
+              <a:t> WebAssembly (client-side)</a:t>
             </a:r>
             <a:endParaRPr lang="en-US" dirty="0"/>
           </a:p>
@@ -9390,6 +9447,24 @@
 </file>
 
 <file path=customXml/item1.xml><?xml version="1.0" encoding="utf-8"?>
+<?mso-contentType ?>
+<FormTemplates xmlns="http://schemas.microsoft.com/sharepoint/v3/contenttype/forms">
+  <Display>DocumentLibraryForm</Display>
+  <Edit>DocumentLibraryForm</Edit>
+  <New>DocumentLibraryForm</New>
+</FormTemplates>
+</file>
+
+<file path=customXml/item2.xml><?xml version="1.0" encoding="utf-8"?>
+<p:properties xmlns:p="http://schemas.microsoft.com/office/2006/metadata/properties" xmlns:xsi="http://www.w3.org/2001/XMLSchema-instance" xmlns:pc="http://schemas.microsoft.com/office/infopath/2007/PartnerControls">
+  <documentManagement>
+    <_ip_UnifiedCompliancePolicyProperties xmlns="http://schemas.microsoft.com/sharepoint/v3" xsi:nil="true"/>
+    <_ip_UnifiedCompliancePolicyUIAction xmlns="http://schemas.microsoft.com/sharepoint/v3" xsi:nil="true"/>
+  </documentManagement>
+</p:properties>
+</file>
+
+<file path=customXml/item3.xml><?xml version="1.0" encoding="utf-8"?>
 <ct:contentTypeSchema xmlns:ct="http://schemas.microsoft.com/office/2006/metadata/contentType" xmlns:ma="http://schemas.microsoft.com/office/2006/metadata/properties/metaAttributes" ct:_="" ma:_="" ma:contentTypeName="Document" ma:contentTypeID="0x01010022F88B0CCF1BBA489747F146E6B5E06D" ma:contentTypeVersion="10" ma:contentTypeDescription="Create a new document." ma:contentTypeScope="" ma:versionID="e1162cc15dbfb914ec52a789942caef8">
   <xsd:schema xmlns:xsd="http://www.w3.org/2001/XMLSchema" xmlns:xs="http://www.w3.org/2001/XMLSchema" xmlns:p="http://schemas.microsoft.com/office/2006/metadata/properties" xmlns:ns1="http://schemas.microsoft.com/sharepoint/v3" xmlns:ns2="569b343d-e775-480b-9b2b-6a6986deb9b0" xmlns:ns3="11245976-3b4d-4794-a754-317688483df2" targetNamespace="http://schemas.microsoft.com/office/2006/metadata/properties" ma:root="true" ma:fieldsID="158813283217a5160f6383901b0d05a5" ns1:_="" ns2:_="" ns3:_="">
     <xsd:import namespace="http://schemas.microsoft.com/sharepoint/v3"/>
@@ -9597,40 +9672,10 @@
 </ct:contentTypeSchema>
 </file>
 
-<file path=customXml/item2.xml><?xml version="1.0" encoding="utf-8"?>
-<p:properties xmlns:p="http://schemas.microsoft.com/office/2006/metadata/properties" xmlns:xsi="http://www.w3.org/2001/XMLSchema-instance" xmlns:pc="http://schemas.microsoft.com/office/infopath/2007/PartnerControls">
-  <documentManagement>
-    <_ip_UnifiedCompliancePolicyProperties xmlns="http://schemas.microsoft.com/sharepoint/v3" xsi:nil="true"/>
-    <_ip_UnifiedCompliancePolicyUIAction xmlns="http://schemas.microsoft.com/sharepoint/v3" xsi:nil="true"/>
-  </documentManagement>
-</p:properties>
-</file>
-
-<file path=customXml/item3.xml><?xml version="1.0" encoding="utf-8"?>
-<?mso-contentType ?>
-<FormTemplates xmlns="http://schemas.microsoft.com/sharepoint/v3/contenttype/forms">
-  <Display>DocumentLibraryForm</Display>
-  <Edit>DocumentLibraryForm</Edit>
-  <New>DocumentLibraryForm</New>
-</FormTemplates>
-</file>
-
 <file path=customXml/itemProps1.xml><?xml version="1.0" encoding="utf-8"?>
-<ds:datastoreItem xmlns:ds="http://schemas.openxmlformats.org/officeDocument/2006/customXml" ds:itemID="{345A321A-8CE3-45D5-9A72-BB0D8FA29E2D}">
+<ds:datastoreItem xmlns:ds="http://schemas.openxmlformats.org/officeDocument/2006/customXml" ds:itemID="{093821A7-5528-48BE-BD00-067FBFDD28D5}">
   <ds:schemaRefs>
-    <ds:schemaRef ds:uri="http://schemas.microsoft.com/office/2006/metadata/contentType"/>
-    <ds:schemaRef ds:uri="http://schemas.microsoft.com/office/2006/metadata/properties/metaAttributes"/>
-    <ds:schemaRef ds:uri="http://www.w3.org/2001/XMLSchema"/>
-    <ds:schemaRef ds:uri="http://schemas.microsoft.com/office/2006/metadata/properties"/>
-    <ds:schemaRef ds:uri="http://schemas.microsoft.com/sharepoint/v3"/>
-    <ds:schemaRef ds:uri="569b343d-e775-480b-9b2b-6a6986deb9b0"/>
-    <ds:schemaRef ds:uri="11245976-3b4d-4794-a754-317688483df2"/>
-    <ds:schemaRef ds:uri="http://schemas.microsoft.com/office/2006/documentManagement/types"/>
-    <ds:schemaRef ds:uri="http://schemas.microsoft.com/office/infopath/2007/PartnerControls"/>
-    <ds:schemaRef ds:uri="http://schemas.openxmlformats.org/package/2006/metadata/core-properties"/>
-    <ds:schemaRef ds:uri="http://purl.org/dc/elements/1.1/"/>
-    <ds:schemaRef ds:uri="http://purl.org/dc/terms/"/>
-    <ds:schemaRef ds:uri="http://schemas.microsoft.com/internal/obd"/>
+    <ds:schemaRef ds:uri="http://schemas.microsoft.com/sharepoint/v3/contenttype/forms"/>
   </ds:schemaRefs>
 </ds:datastoreItem>
 </file>
@@ -9654,9 +9699,21 @@
 </file>
 
 <file path=customXml/itemProps3.xml><?xml version="1.0" encoding="utf-8"?>
-<ds:datastoreItem xmlns:ds="http://schemas.openxmlformats.org/officeDocument/2006/customXml" ds:itemID="{093821A7-5528-48BE-BD00-067FBFDD28D5}">
+<ds:datastoreItem xmlns:ds="http://schemas.openxmlformats.org/officeDocument/2006/customXml" ds:itemID="{345A321A-8CE3-45D5-9A72-BB0D8FA29E2D}">
   <ds:schemaRefs>
-    <ds:schemaRef ds:uri="http://schemas.microsoft.com/sharepoint/v3/contenttype/forms"/>
+    <ds:schemaRef ds:uri="http://schemas.microsoft.com/office/2006/metadata/contentType"/>
+    <ds:schemaRef ds:uri="http://schemas.microsoft.com/office/2006/metadata/properties/metaAttributes"/>
+    <ds:schemaRef ds:uri="http://www.w3.org/2001/XMLSchema"/>
+    <ds:schemaRef ds:uri="http://schemas.microsoft.com/office/2006/metadata/properties"/>
+    <ds:schemaRef ds:uri="http://schemas.microsoft.com/sharepoint/v3"/>
+    <ds:schemaRef ds:uri="569b343d-e775-480b-9b2b-6a6986deb9b0"/>
+    <ds:schemaRef ds:uri="11245976-3b4d-4794-a754-317688483df2"/>
+    <ds:schemaRef ds:uri="http://schemas.microsoft.com/office/2006/documentManagement/types"/>
+    <ds:schemaRef ds:uri="http://schemas.microsoft.com/office/infopath/2007/PartnerControls"/>
+    <ds:schemaRef ds:uri="http://schemas.openxmlformats.org/package/2006/metadata/core-properties"/>
+    <ds:schemaRef ds:uri="http://purl.org/dc/elements/1.1/"/>
+    <ds:schemaRef ds:uri="http://purl.org/dc/terms/"/>
+    <ds:schemaRef ds:uri="http://schemas.microsoft.com/internal/obd"/>
   </ds:schemaRefs>
 </ds:datastoreItem>
 </file>
</xml_diff>